<commit_message>
add v2p1, fix company name
add v2p1, fix company name
teTra aviation corp. <- teTra Aviation Corp.
</commit_message>
<xml_diff>
--- a/230827_make_remove_before_flight_tag_v2/230827_remove_before_flight_tag_v2.pptx
+++ b/230827_make_remove_before_flight_tag_v2/230827_remove_before_flight_tag_v2.pptx
@@ -3925,7 +3925,39 @@
                   <a:schemeClr val="bg1"/>
                 </a:solidFill>
               </a:rPr>
-              <a:t> Aviation Corp.</a:t>
+              <a:t> </a:t>
+            </a:r>
+            <a:r>
+              <a:rPr lang="en-US" altLang="ja-JP" sz="3600" b="1" dirty="0">
+                <a:solidFill>
+                  <a:schemeClr val="bg1"/>
+                </a:solidFill>
+              </a:rPr>
+              <a:t>a</a:t>
+            </a:r>
+            <a:r>
+              <a:rPr kumimoji="1" lang="en-US" altLang="ja-JP" sz="3600" b="1" dirty="0">
+                <a:solidFill>
+                  <a:schemeClr val="bg1"/>
+                </a:solidFill>
+              </a:rPr>
+              <a:t>viation </a:t>
+            </a:r>
+            <a:r>
+              <a:rPr lang="en-US" altLang="ja-JP" sz="3600" b="1" dirty="0">
+                <a:solidFill>
+                  <a:schemeClr val="bg1"/>
+                </a:solidFill>
+              </a:rPr>
+              <a:t>c</a:t>
+            </a:r>
+            <a:r>
+              <a:rPr kumimoji="1" lang="en-US" altLang="ja-JP" sz="3600" b="1" dirty="0">
+                <a:solidFill>
+                  <a:schemeClr val="bg1"/>
+                </a:solidFill>
+              </a:rPr>
+              <a:t>orp.</a:t>
             </a:r>
             <a:endParaRPr kumimoji="1" lang="ja-JP" altLang="en-US" sz="3600" dirty="0">
               <a:solidFill>
@@ -4239,7 +4271,39 @@
                   <a:schemeClr val="bg1"/>
                 </a:solidFill>
               </a:rPr>
-              <a:t> Aviation Corp.</a:t>
+              <a:t> </a:t>
+            </a:r>
+            <a:r>
+              <a:rPr lang="en-US" altLang="ja-JP" sz="3600" b="1" dirty="0">
+                <a:solidFill>
+                  <a:schemeClr val="bg1"/>
+                </a:solidFill>
+              </a:rPr>
+              <a:t>a</a:t>
+            </a:r>
+            <a:r>
+              <a:rPr kumimoji="1" lang="en-US" altLang="ja-JP" sz="3600" b="1" dirty="0">
+                <a:solidFill>
+                  <a:schemeClr val="bg1"/>
+                </a:solidFill>
+              </a:rPr>
+              <a:t>viation </a:t>
+            </a:r>
+            <a:r>
+              <a:rPr lang="en-US" altLang="ja-JP" sz="3600" b="1" dirty="0">
+                <a:solidFill>
+                  <a:schemeClr val="bg1"/>
+                </a:solidFill>
+              </a:rPr>
+              <a:t>c</a:t>
+            </a:r>
+            <a:r>
+              <a:rPr kumimoji="1" lang="en-US" altLang="ja-JP" sz="3600" b="1" dirty="0">
+                <a:solidFill>
+                  <a:schemeClr val="bg1"/>
+                </a:solidFill>
+              </a:rPr>
+              <a:t>orp.</a:t>
             </a:r>
             <a:endParaRPr kumimoji="1" lang="ja-JP" altLang="en-US" sz="3600" dirty="0">
               <a:solidFill>

</xml_diff>